<commit_message>
➕ Tweak to Introduction Slide
</commit_message>
<xml_diff>
--- a/Final Presentation.pptx
+++ b/Final Presentation.pptx
@@ -15833,7 +15833,7 @@
               <a:buChar char="-"/>
             </a:pPr>
             <a:r>
-              <a:rPr lang="en-GB" sz="5400" b="1" dirty="0">
+              <a:rPr lang="en-GB" sz="5400" dirty="0">
                 <a:solidFill>
                   <a:schemeClr val="dk2"/>
                 </a:solidFill>
@@ -15843,6 +15843,85 @@
                 <a:sym typeface="Nunito"/>
               </a:rPr>
               <a:t>Predicting crime is extremely costly and time consuming</a:t>
+            </a:r>
+          </a:p>
+          <a:p>
+            <a:pPr marL="685800" indent="-685800">
+              <a:buFontTx/>
+              <a:buChar char="-"/>
+            </a:pPr>
+            <a:endParaRPr lang="en-GB" sz="5400" dirty="0">
+              <a:solidFill>
+                <a:schemeClr val="dk2"/>
+              </a:solidFill>
+              <a:latin typeface="Nunito"/>
+              <a:ea typeface="Nunito"/>
+              <a:cs typeface="Nunito"/>
+              <a:sym typeface="Nunito"/>
+            </a:endParaRPr>
+          </a:p>
+          <a:p>
+            <a:pPr marL="685800" indent="-685800">
+              <a:buFontTx/>
+              <a:buChar char="-"/>
+            </a:pPr>
+            <a:r>
+              <a:rPr lang="en-GB" sz="5400" dirty="0">
+                <a:solidFill>
+                  <a:schemeClr val="dk2"/>
+                </a:solidFill>
+                <a:latin typeface="Nunito"/>
+                <a:ea typeface="Nunito"/>
+                <a:cs typeface="Nunito"/>
+                <a:sym typeface="Nunito"/>
+              </a:rPr>
+              <a:t>Crime is dependent on various </a:t>
+            </a:r>
+            <a:br>
+              <a:rPr lang="en-GB" sz="5400" dirty="0">
+                <a:solidFill>
+                  <a:schemeClr val="dk2"/>
+                </a:solidFill>
+                <a:latin typeface="Nunito"/>
+                <a:ea typeface="Nunito"/>
+                <a:cs typeface="Nunito"/>
+                <a:sym typeface="Nunito"/>
+              </a:rPr>
+            </a:br>
+            <a:r>
+              <a:rPr lang="en-GB" sz="5400" dirty="0">
+                <a:solidFill>
+                  <a:schemeClr val="dk2"/>
+                </a:solidFill>
+                <a:latin typeface="Nunito"/>
+                <a:ea typeface="Nunito"/>
+                <a:cs typeface="Nunito"/>
+                <a:sym typeface="Nunito"/>
+              </a:rPr>
+              <a:t>different factors such as weather, </a:t>
+            </a:r>
+            <a:br>
+              <a:rPr lang="en-GB" sz="5400" dirty="0">
+                <a:solidFill>
+                  <a:schemeClr val="dk2"/>
+                </a:solidFill>
+                <a:latin typeface="Nunito"/>
+                <a:ea typeface="Nunito"/>
+                <a:cs typeface="Nunito"/>
+                <a:sym typeface="Nunito"/>
+              </a:rPr>
+            </a:br>
+            <a:r>
+              <a:rPr lang="en-GB" sz="5400" dirty="0">
+                <a:solidFill>
+                  <a:schemeClr val="dk2"/>
+                </a:solidFill>
+                <a:latin typeface="Nunito"/>
+                <a:ea typeface="Nunito"/>
+                <a:cs typeface="Nunito"/>
+                <a:sym typeface="Nunito"/>
+              </a:rPr>
+              <a:t>location, social and economic factors [1]</a:t>
             </a:r>
           </a:p>
           <a:p>
@@ -15861,12 +15940,8 @@
             </a:endParaRPr>
           </a:p>
           <a:p>
-            <a:pPr marL="685800" indent="-685800">
-              <a:buFontTx/>
-              <a:buChar char="-"/>
-            </a:pPr>
-            <a:r>
-              <a:rPr lang="en-GB" sz="5400" b="1" dirty="0">
+            <a:r>
+              <a:rPr lang="en-GB" sz="6000" b="1" i="1" dirty="0">
                 <a:solidFill>
                   <a:schemeClr val="dk2"/>
                 </a:solidFill>
@@ -15875,60 +15950,10 @@
                 <a:cs typeface="Nunito"/>
                 <a:sym typeface="Nunito"/>
               </a:rPr>
-              <a:t>Crime is dependent on various </a:t>
-            </a:r>
-            <a:br>
-              <a:rPr lang="en-GB" sz="5400" b="1" dirty="0">
-                <a:solidFill>
-                  <a:schemeClr val="dk2"/>
-                </a:solidFill>
-                <a:latin typeface="Nunito"/>
-                <a:ea typeface="Nunito"/>
-                <a:cs typeface="Nunito"/>
-                <a:sym typeface="Nunito"/>
-              </a:rPr>
-            </a:br>
-            <a:r>
-              <a:rPr lang="en-GB" sz="5400" b="1" dirty="0">
-                <a:solidFill>
-                  <a:schemeClr val="dk2"/>
-                </a:solidFill>
-                <a:latin typeface="Nunito"/>
-                <a:ea typeface="Nunito"/>
-                <a:cs typeface="Nunito"/>
-                <a:sym typeface="Nunito"/>
-              </a:rPr>
-              <a:t>different factors such as weather, </a:t>
-            </a:r>
-            <a:br>
-              <a:rPr lang="en-GB" sz="5400" b="1" dirty="0">
-                <a:solidFill>
-                  <a:schemeClr val="dk2"/>
-                </a:solidFill>
-                <a:latin typeface="Nunito"/>
-                <a:ea typeface="Nunito"/>
-                <a:cs typeface="Nunito"/>
-                <a:sym typeface="Nunito"/>
-              </a:rPr>
-            </a:br>
-            <a:r>
-              <a:rPr lang="en-GB" sz="5400" b="1" dirty="0">
-                <a:solidFill>
-                  <a:schemeClr val="dk2"/>
-                </a:solidFill>
-                <a:latin typeface="Nunito"/>
-                <a:ea typeface="Nunito"/>
-                <a:cs typeface="Nunito"/>
-                <a:sym typeface="Nunito"/>
-              </a:rPr>
-              <a:t>location, social and economic factors [1]</a:t>
-            </a:r>
-          </a:p>
-          <a:p>
-            <a:pPr marL="685800" indent="-685800">
-              <a:buFontTx/>
-              <a:buChar char="-"/>
-            </a:pPr>
+              <a:t>Objective</a:t>
+            </a:r>
+          </a:p>
+          <a:p>
             <a:endParaRPr lang="en-GB" sz="5400" b="1" dirty="0">
               <a:solidFill>
                 <a:schemeClr val="dk2"/>
@@ -15941,32 +15966,7 @@
           </a:p>
           <a:p>
             <a:r>
-              <a:rPr lang="en-GB" sz="6000" b="1" i="1" dirty="0">
-                <a:solidFill>
-                  <a:schemeClr val="dk2"/>
-                </a:solidFill>
-                <a:latin typeface="Nunito"/>
-                <a:ea typeface="Nunito"/>
-                <a:cs typeface="Nunito"/>
-                <a:sym typeface="Nunito"/>
-              </a:rPr>
-              <a:t>Objective</a:t>
-            </a:r>
-          </a:p>
-          <a:p>
-            <a:endParaRPr lang="en-GB" sz="5400" b="1" dirty="0">
-              <a:solidFill>
-                <a:schemeClr val="dk2"/>
-              </a:solidFill>
-              <a:latin typeface="Nunito"/>
-              <a:ea typeface="Nunito"/>
-              <a:cs typeface="Nunito"/>
-              <a:sym typeface="Nunito"/>
-            </a:endParaRPr>
-          </a:p>
-          <a:p>
-            <a:r>
-              <a:rPr lang="en-GB" sz="5400" b="1" dirty="0">
+              <a:rPr lang="en-GB" sz="5400" i="1" dirty="0">
                 <a:solidFill>
                   <a:schemeClr val="dk2"/>
                 </a:solidFill>

</xml_diff>

<commit_message>
➕ Tweak to  Final Dataset Slide
</commit_message>
<xml_diff>
--- a/Final Presentation.pptx
+++ b/Final Presentation.pptx
@@ -17142,7 +17142,7 @@
               <a:buAutoNum type="arabicPeriod"/>
             </a:pPr>
             <a:r>
-              <a:rPr lang="en-GB" sz="4000" dirty="0">
+              <a:rPr lang="en-GB" sz="4000">
                 <a:sym typeface="Nunito"/>
               </a:rPr>
               <a:t>Neighbourhood</a:t>
@@ -17154,22 +17154,16 @@
               <a:buAutoNum type="arabicPeriod"/>
             </a:pPr>
             <a:r>
+              <a:rPr lang="en-GB" sz="4000">
+                <a:sym typeface="Nunito"/>
+              </a:rPr>
+              <a:t>Distance </a:t>
+            </a:r>
+            <a:r>
               <a:rPr lang="en-GB" sz="4000" dirty="0">
                 <a:sym typeface="Nunito"/>
               </a:rPr>
-              <a:t>Block of Crime</a:t>
-            </a:r>
-          </a:p>
-          <a:p>
-            <a:pPr marL="742950" indent="-742950">
-              <a:buFont typeface="+mj-lt"/>
-              <a:buAutoNum type="arabicPeriod"/>
-            </a:pPr>
-            <a:r>
-              <a:rPr lang="en-GB" sz="4000" dirty="0">
-                <a:sym typeface="Nunito"/>
-              </a:rPr>
-              <a:t>Distance from nearest Graffiti</a:t>
+              <a:t>from nearest Graffiti</a:t>
             </a:r>
           </a:p>
           <a:p>

</xml_diff>

<commit_message>
✅ Final Presentation Slides
</commit_message>
<xml_diff>
--- a/Final Presentation.pptx
+++ b/Final Presentation.pptx
@@ -15381,7 +15381,7 @@
               <a:buChar char="-"/>
             </a:pPr>
             <a:r>
-              <a:rPr lang="en-GB" sz="5400" b="1" dirty="0">
+              <a:rPr lang="en-GB" sz="5400" dirty="0">
                 <a:solidFill>
                   <a:schemeClr val="dk2"/>
                 </a:solidFill>
@@ -15398,7 +15398,7 @@
               <a:buFontTx/>
               <a:buChar char="-"/>
             </a:pPr>
-            <a:endParaRPr lang="en-GB" sz="5400" b="1" dirty="0">
+            <a:endParaRPr lang="en-GB" sz="5400" dirty="0">
               <a:solidFill>
                 <a:schemeClr val="dk2"/>
               </a:solidFill>
@@ -15414,7 +15414,7 @@
               <a:buChar char="-"/>
             </a:pPr>
             <a:r>
-              <a:rPr lang="en-GB" sz="5400" b="1" dirty="0">
+              <a:rPr lang="en-GB" sz="5400" dirty="0">
                 <a:solidFill>
                   <a:schemeClr val="dk2"/>
                 </a:solidFill>
@@ -15431,7 +15431,7 @@
               <a:buFontTx/>
               <a:buChar char="-"/>
             </a:pPr>
-            <a:endParaRPr lang="en-GB" sz="5400" b="1" dirty="0">
+            <a:endParaRPr lang="en-GB" sz="5400" dirty="0">
               <a:solidFill>
                 <a:schemeClr val="dk2"/>
               </a:solidFill>
@@ -15447,7 +15447,7 @@
               <a:buChar char="-"/>
             </a:pPr>
             <a:r>
-              <a:rPr lang="en-GB" sz="5400" b="1" dirty="0">
+              <a:rPr lang="en-GB" sz="5400" dirty="0">
                 <a:solidFill>
                   <a:schemeClr val="dk2"/>
                 </a:solidFill>
@@ -17142,7 +17142,7 @@
               <a:buAutoNum type="arabicPeriod"/>
             </a:pPr>
             <a:r>
-              <a:rPr lang="en-GB" sz="4000">
+              <a:rPr lang="en-GB" sz="4000" dirty="0">
                 <a:sym typeface="Nunito"/>
               </a:rPr>
               <a:t>Neighbourhood</a:t>
@@ -17154,16 +17154,10 @@
               <a:buAutoNum type="arabicPeriod"/>
             </a:pPr>
             <a:r>
-              <a:rPr lang="en-GB" sz="4000">
+              <a:rPr lang="en-GB" sz="4000" dirty="0">
                 <a:sym typeface="Nunito"/>
               </a:rPr>
-              <a:t>Distance </a:t>
-            </a:r>
-            <a:r>
-              <a:rPr lang="en-GB" sz="4000" dirty="0">
-                <a:sym typeface="Nunito"/>
-              </a:rPr>
-              <a:t>from nearest Graffiti</a:t>
+              <a:t>Distance from nearest Graffiti</a:t>
             </a:r>
           </a:p>
           <a:p>
@@ -17609,7 +17603,7 @@
             </a:r>
           </a:p>
           <a:p>
-            <a:pPr marL="685800" lvl="0" indent="-685800">
+            <a:pPr marL="685800" indent="-685800">
               <a:buFont typeface="Arial" panose="020B0604020202020204" pitchFamily="34" charset="0"/>
               <a:buChar char="•"/>
             </a:pPr>
@@ -17617,7 +17611,7 @@
               <a:rPr lang="en-US" sz="4000" dirty="0">
                 <a:sym typeface="Nunito"/>
               </a:rPr>
-              <a:t>Neighborhood</a:t>
+              <a:t>One hot encoded Neighborhood</a:t>
             </a:r>
           </a:p>
           <a:p>

</xml_diff>